<commit_message>
Adicionada apresentação notebook inpars e caderno 3 inpars
</commit_message>
<xml_diff>
--- a/8 - inpars/notebook/apresentacao_inpars.pptx
+++ b/8 - inpars/notebook/apresentacao_inpars.pptx
@@ -5,10 +5,10 @@
     <p:sldMasterId id="2147483648" r:id="rId4"/>
   </p:sldMasterIdLst>
   <p:notesMasterIdLst>
-    <p:notesMasterId r:id="rId13"/>
+    <p:notesMasterId r:id="rId14"/>
   </p:notesMasterIdLst>
   <p:handoutMasterIdLst>
-    <p:handoutMasterId r:id="rId14"/>
+    <p:handoutMasterId r:id="rId15"/>
   </p:handoutMasterIdLst>
   <p:sldIdLst>
     <p:sldId id="256" r:id="rId5"/>
@@ -18,7 +18,8 @@
     <p:sldId id="317" r:id="rId9"/>
     <p:sldId id="316" r:id="rId10"/>
     <p:sldId id="308" r:id="rId11"/>
-    <p:sldId id="289" r:id="rId12"/>
+    <p:sldId id="318" r:id="rId12"/>
+    <p:sldId id="289" r:id="rId13"/>
   </p:sldIdLst>
   <p:sldSz cx="12192000" cy="6858000"/>
   <p:notesSz cx="6858000" cy="9144000"/>
@@ -1350,6 +1351,91 @@
             <a:fld id="{35BAF473-2665-42A7-89E3-C7BA7EB58D12}" type="slidenum">
               <a:rPr lang="pt-BR" smtClean="0"/>
               <a:t>8</a:t>
+            </a:fld>
+            <a:endParaRPr lang="pt-BR"/>
+          </a:p>
+        </p:txBody>
+      </p:sp>
+    </p:spTree>
+    <p:extLst>
+      <p:ext uri="{BB962C8B-B14F-4D97-AF65-F5344CB8AC3E}">
+        <p14:creationId xmlns:p14="http://schemas.microsoft.com/office/powerpoint/2010/main" val="1655814937"/>
+      </p:ext>
+    </p:extLst>
+  </p:cSld>
+  <p:clrMapOvr>
+    <a:masterClrMapping/>
+  </p:clrMapOvr>
+</p:notes>
+</file>
+
+<file path=ppt/notesSlides/notesSlide9.xml><?xml version="1.0" encoding="utf-8"?>
+<p:notes xmlns:a="http://schemas.openxmlformats.org/drawingml/2006/main" xmlns:r="http://schemas.openxmlformats.org/officeDocument/2006/relationships" xmlns:p="http://schemas.openxmlformats.org/presentationml/2006/main">
+  <p:cSld>
+    <p:spTree>
+      <p:nvGrpSpPr>
+        <p:cNvPr id="1" name=""/>
+        <p:cNvGrpSpPr/>
+        <p:nvPr/>
+      </p:nvGrpSpPr>
+      <p:grpSpPr>
+        <a:xfrm>
+          <a:off x="0" y="0"/>
+          <a:ext cx="0" cy="0"/>
+          <a:chOff x="0" y="0"/>
+          <a:chExt cx="0" cy="0"/>
+        </a:xfrm>
+      </p:grpSpPr>
+      <p:sp>
+        <p:nvSpPr>
+          <p:cNvPr id="2" name="Espaço Reservado para Imagem de Slide 1"/>
+          <p:cNvSpPr>
+            <a:spLocks noGrp="1" noRot="1" noChangeAspect="1"/>
+          </p:cNvSpPr>
+          <p:nvPr>
+            <p:ph type="sldImg"/>
+          </p:nvPr>
+        </p:nvSpPr>
+        <p:spPr/>
+      </p:sp>
+      <p:sp>
+        <p:nvSpPr>
+          <p:cNvPr id="3" name="Espaço Reservado para Anotações 2"/>
+          <p:cNvSpPr>
+            <a:spLocks noGrp="1"/>
+          </p:cNvSpPr>
+          <p:nvPr>
+            <p:ph type="body" idx="1"/>
+          </p:nvPr>
+        </p:nvSpPr>
+        <p:spPr/>
+        <p:txBody>
+          <a:bodyPr/>
+          <a:lstStyle/>
+          <a:p>
+            <a:endParaRPr lang="pt-BR" noProof="0" dirty="0"/>
+          </a:p>
+        </p:txBody>
+      </p:sp>
+      <p:sp>
+        <p:nvSpPr>
+          <p:cNvPr id="4" name="Espaço Reservado para Número de Slide 3"/>
+          <p:cNvSpPr>
+            <a:spLocks noGrp="1"/>
+          </p:cNvSpPr>
+          <p:nvPr>
+            <p:ph type="sldNum" sz="quarter" idx="5"/>
+          </p:nvPr>
+        </p:nvSpPr>
+        <p:spPr/>
+        <p:txBody>
+          <a:bodyPr/>
+          <a:lstStyle/>
+          <a:p>
+            <a:pPr rtl="0"/>
+            <a:fld id="{35BAF473-2665-42A7-89E3-C7BA7EB58D12}" type="slidenum">
+              <a:rPr lang="pt-BR" smtClean="0"/>
+              <a:t>9</a:t>
             </a:fld>
             <a:endParaRPr lang="pt-BR"/>
           </a:p>
@@ -12956,6 +13042,9 @@
           </a:lstStyle>
           <a:p>
             <a:pPr marL="0" indent="0">
+              <a:lnSpc>
+                <a:spcPct val="100000"/>
+              </a:lnSpc>
               <a:buNone/>
             </a:pPr>
             <a:r>
@@ -13062,14 +13151,14 @@
           <p:nvPr>
             <p:extLst>
               <p:ext uri="{D42A27DB-BD31-4B8C-83A1-F6EECF244321}">
-                <p14:modId xmlns:p14="http://schemas.microsoft.com/office/powerpoint/2010/main" val="4104200602"/>
+                <p14:modId xmlns:p14="http://schemas.microsoft.com/office/powerpoint/2010/main" val="301200413"/>
               </p:ext>
             </p:extLst>
           </p:nvPr>
         </p:nvGraphicFramePr>
         <p:xfrm>
-          <a:off x="1691512" y="2416628"/>
-          <a:ext cx="8127999" cy="1112520"/>
+          <a:off x="1285336" y="2416628"/>
+          <a:ext cx="8534175" cy="1112520"/>
         </p:xfrm>
         <a:graphic>
           <a:graphicData uri="http://schemas.openxmlformats.org/drawingml/2006/table">
@@ -13078,21 +13167,21 @@
                 <a:tableStyleId>{5C22544A-7EE6-4342-B048-85BDC9FD1C3A}</a:tableStyleId>
               </a:tblPr>
               <a:tblGrid>
-                <a:gridCol w="2709333">
+                <a:gridCol w="2844725">
                   <a:extLst>
                     <a:ext uri="{9D8B030D-6E8A-4147-A177-3AD203B41FA5}">
                       <a16:colId xmlns:a16="http://schemas.microsoft.com/office/drawing/2014/main" val="1325720365"/>
                     </a:ext>
                   </a:extLst>
                 </a:gridCol>
-                <a:gridCol w="2709333">
+                <a:gridCol w="2844725">
                   <a:extLst>
                     <a:ext uri="{9D8B030D-6E8A-4147-A177-3AD203B41FA5}">
                       <a16:colId xmlns:a16="http://schemas.microsoft.com/office/drawing/2014/main" val="4049910032"/>
                     </a:ext>
                   </a:extLst>
                 </a:gridCol>
-                <a:gridCol w="2709333">
+                <a:gridCol w="2844725">
                   <a:extLst>
                     <a:ext uri="{9D8B030D-6E8A-4147-A177-3AD203B41FA5}">
                       <a16:colId xmlns:a16="http://schemas.microsoft.com/office/drawing/2014/main" val="3934288485"/>
@@ -13118,11 +13207,11 @@
                     <a:p>
                       <a:r>
                         <a:rPr lang="pt-BR" dirty="0"/>
-                        <a:t>Sem </a:t>
+                        <a:t>Antes do fine-</a:t>
                       </a:r>
                       <a:r>
                         <a:rPr lang="pt-BR" dirty="0" err="1"/>
-                        <a:t>token_type_ids</a:t>
+                        <a:t>tuning</a:t>
                       </a:r>
                       <a:endParaRPr lang="pt-BR" dirty="0"/>
                     </a:p>
@@ -13136,11 +13225,11 @@
                     <a:p>
                       <a:r>
                         <a:rPr lang="pt-BR" dirty="0"/>
-                        <a:t>Com </a:t>
+                        <a:t>Depois do fine-</a:t>
                       </a:r>
                       <a:r>
                         <a:rPr lang="pt-BR" dirty="0" err="1"/>
-                        <a:t>token_type_ids</a:t>
+                        <a:t>tuning</a:t>
                       </a:r>
                       <a:endParaRPr lang="pt-BR" dirty="0"/>
                     </a:p>
@@ -13161,11 +13250,11 @@
                     <a:p>
                       <a:r>
                         <a:rPr lang="pt-BR" dirty="0"/>
-                        <a:t>Antes do fine-</a:t>
+                        <a:t>Sem corrigir </a:t>
                       </a:r>
                       <a:r>
                         <a:rPr lang="pt-BR" dirty="0" err="1"/>
-                        <a:t>tuning</a:t>
+                        <a:t>token_type_ids</a:t>
                       </a:r>
                       <a:endParaRPr lang="pt-BR" dirty="0"/>
                     </a:p>
@@ -13212,11 +13301,11 @@
                     <a:p>
                       <a:r>
                         <a:rPr lang="pt-BR" dirty="0"/>
-                        <a:t>Depois do fine-</a:t>
+                        <a:t>Corrigindo </a:t>
                       </a:r>
                       <a:r>
                         <a:rPr lang="pt-BR" dirty="0" err="1"/>
-                        <a:t>tuning</a:t>
+                        <a:t>token_type_ids</a:t>
                       </a:r>
                       <a:endParaRPr lang="pt-BR" dirty="0"/>
                     </a:p>
@@ -13247,7 +13336,7 @@
                             <a:srgbClr val="FF0000"/>
                           </a:solidFill>
                         </a:rPr>
-                        <a:t>0,6557 (melhor caso)</a:t>
+                        <a:t>0,6557</a:t>
                       </a:r>
                     </a:p>
                   </a:txBody>
@@ -13265,10 +13354,10 @@
       </p:graphicFrame>
       <p:pic>
         <p:nvPicPr>
-          <p:cNvPr id="21" name="Imagem 20">
-            <a:extLst>
-              <a:ext uri="{FF2B5EF4-FFF2-40B4-BE49-F238E27FC236}">
-                <a16:creationId xmlns:a16="http://schemas.microsoft.com/office/drawing/2014/main" id="{B5E44DA4-A5B7-723D-D9CB-B47CDBE908CB}"/>
+          <p:cNvPr id="23" name="Imagem 22">
+            <a:extLst>
+              <a:ext uri="{FF2B5EF4-FFF2-40B4-BE49-F238E27FC236}">
+                <a16:creationId xmlns:a16="http://schemas.microsoft.com/office/drawing/2014/main" id="{05A906F7-3033-3D0E-95D3-4DA52A57BE7D}"/>
               </a:ext>
             </a:extLst>
           </p:cNvPr>
@@ -13285,44 +13374,49 @@
         </p:blipFill>
         <p:spPr>
           <a:xfrm>
-            <a:off x="176168" y="4008942"/>
-            <a:ext cx="5301866" cy="2446386"/>
+            <a:off x="3187803" y="4017124"/>
+            <a:ext cx="5301866" cy="2438204"/>
           </a:xfrm>
           <a:prstGeom prst="rect">
             <a:avLst/>
           </a:prstGeom>
         </p:spPr>
       </p:pic>
-      <p:pic>
-        <p:nvPicPr>
-          <p:cNvPr id="23" name="Imagem 22">
-            <a:extLst>
-              <a:ext uri="{FF2B5EF4-FFF2-40B4-BE49-F238E27FC236}">
-                <a16:creationId xmlns:a16="http://schemas.microsoft.com/office/drawing/2014/main" id="{05A906F7-3033-3D0E-95D3-4DA52A57BE7D}"/>
-              </a:ext>
-            </a:extLst>
-          </p:cNvPr>
-          <p:cNvPicPr>
-            <a:picLocks noChangeAspect="1"/>
-          </p:cNvPicPr>
+      <p:sp>
+        <p:nvSpPr>
+          <p:cNvPr id="4" name="CaixaDeTexto 3">
+            <a:extLst>
+              <a:ext uri="{FF2B5EF4-FFF2-40B4-BE49-F238E27FC236}">
+                <a16:creationId xmlns:a16="http://schemas.microsoft.com/office/drawing/2014/main" id="{0348C6AB-FCA1-0C7A-2400-F54B73EC69F5}"/>
+              </a:ext>
+            </a:extLst>
+          </p:cNvPr>
+          <p:cNvSpPr txBox="1"/>
           <p:nvPr/>
-        </p:nvPicPr>
-        <p:blipFill>
-          <a:blip r:embed="rId4"/>
-          <a:stretch>
-            <a:fillRect/>
-          </a:stretch>
-        </p:blipFill>
-        <p:spPr>
-          <a:xfrm>
-            <a:off x="6096000" y="4017124"/>
-            <a:ext cx="5301866" cy="2438204"/>
+        </p:nvSpPr>
+        <p:spPr>
+          <a:xfrm rot="20700000">
+            <a:off x="7377469" y="5775209"/>
+            <a:ext cx="2795367" cy="646331"/>
           </a:xfrm>
           <a:prstGeom prst="rect">
             <a:avLst/>
           </a:prstGeom>
-        </p:spPr>
-      </p:pic>
+          <a:noFill/>
+        </p:spPr>
+        <p:txBody>
+          <a:bodyPr wrap="square" rtlCol="0">
+            <a:spAutoFit/>
+          </a:bodyPr>
+          <a:lstStyle/>
+          <a:p>
+            <a:r>
+              <a:rPr lang="pt-BR" dirty="0"/>
+              <a:t>Limitado a 5 exemplos negativos por query</a:t>
+            </a:r>
+          </a:p>
+        </p:txBody>
+      </p:sp>
     </p:spTree>
     <p:extLst>
       <p:ext uri="{BB962C8B-B14F-4D97-AF65-F5344CB8AC3E}">
@@ -13405,8 +13499,8 @@
         </p:nvSpPr>
         <p:spPr>
           <a:xfrm>
-            <a:off x="99194" y="1433527"/>
-            <a:ext cx="11694252" cy="983101"/>
+            <a:off x="99194" y="1433528"/>
+            <a:ext cx="11694252" cy="5131174"/>
           </a:xfrm>
           <a:prstGeom prst="rect">
             <a:avLst/>
@@ -13414,7 +13508,7 @@
         </p:spPr>
         <p:txBody>
           <a:bodyPr rtlCol="0">
-            <a:normAutofit/>
+            <a:normAutofit fontScale="92500" lnSpcReduction="10000"/>
           </a:bodyPr>
           <a:lstStyle>
             <a:lvl1pPr marL="228600" indent="-228600" algn="l" defTabSz="914400" rtl="0" eaLnBrk="1" latinLnBrk="0" hangingPunct="1">
@@ -13582,6 +13676,9 @@
           </a:lstStyle>
           <a:p>
             <a:pPr marL="0" indent="0">
+              <a:lnSpc>
+                <a:spcPct val="110000"/>
+              </a:lnSpc>
               <a:buNone/>
             </a:pPr>
             <a:r>
@@ -13637,6 +13734,9 @@
           </a:p>
           <a:p>
             <a:pPr marL="0" indent="0">
+              <a:lnSpc>
+                <a:spcPct val="110000"/>
+              </a:lnSpc>
               <a:buNone/>
             </a:pPr>
             <a:endParaRPr lang="pt-BR" sz="2400" dirty="0">
@@ -13649,6 +13749,156 @@
           </a:p>
           <a:p>
             <a:pPr marL="0" indent="0">
+              <a:lnSpc>
+                <a:spcPct val="110000"/>
+              </a:lnSpc>
+              <a:buNone/>
+            </a:pPr>
+            <a:r>
+              <a:rPr lang="pt-BR" sz="2400" dirty="0">
+                <a:solidFill>
+                  <a:schemeClr val="accent1"/>
+                </a:solidFill>
+                <a:latin typeface="Arial" panose="020B0604020202020204" pitchFamily="34" charset="0"/>
+                <a:cs typeface="Arial" panose="020B0604020202020204" pitchFamily="34" charset="0"/>
+              </a:rPr>
+              <a:t>	Tentativas pra resolver a questão:</a:t>
+            </a:r>
+          </a:p>
+          <a:p>
+            <a:pPr marL="0" indent="0">
+              <a:lnSpc>
+                <a:spcPct val="110000"/>
+              </a:lnSpc>
+              <a:buNone/>
+            </a:pPr>
+            <a:r>
+              <a:rPr lang="pt-BR" sz="2400" dirty="0">
+                <a:solidFill>
+                  <a:schemeClr val="accent1"/>
+                </a:solidFill>
+                <a:latin typeface="Arial" panose="020B0604020202020204" pitchFamily="34" charset="0"/>
+                <a:cs typeface="Arial" panose="020B0604020202020204" pitchFamily="34" charset="0"/>
+              </a:rPr>
+              <a:t>	- Limitar a no máximo 5 exemplos negativos por query</a:t>
+            </a:r>
+          </a:p>
+          <a:p>
+            <a:pPr marL="0" indent="0">
+              <a:lnSpc>
+                <a:spcPct val="110000"/>
+              </a:lnSpc>
+              <a:buNone/>
+            </a:pPr>
+            <a:r>
+              <a:rPr lang="pt-BR" sz="2400" dirty="0">
+                <a:solidFill>
+                  <a:schemeClr val="accent1"/>
+                </a:solidFill>
+                <a:latin typeface="Arial" panose="020B0604020202020204" pitchFamily="34" charset="0"/>
+                <a:cs typeface="Arial" panose="020B0604020202020204" pitchFamily="34" charset="0"/>
+              </a:rPr>
+              <a:t>	- Balancear o </a:t>
+            </a:r>
+            <a:r>
+              <a:rPr lang="pt-BR" sz="2400" dirty="0" err="1">
+                <a:solidFill>
+                  <a:schemeClr val="accent1"/>
+                </a:solidFill>
+                <a:latin typeface="Arial" panose="020B0604020202020204" pitchFamily="34" charset="0"/>
+                <a:cs typeface="Arial" panose="020B0604020202020204" pitchFamily="34" charset="0"/>
+              </a:rPr>
+              <a:t>dataset</a:t>
+            </a:r>
+            <a:r>
+              <a:rPr lang="pt-BR" sz="2400" dirty="0">
+                <a:solidFill>
+                  <a:schemeClr val="accent1"/>
+                </a:solidFill>
+                <a:latin typeface="Arial" panose="020B0604020202020204" pitchFamily="34" charset="0"/>
+                <a:cs typeface="Arial" panose="020B0604020202020204" pitchFamily="34" charset="0"/>
+              </a:rPr>
+              <a:t> (limitar a 1 exemplo negativo por query)</a:t>
+            </a:r>
+          </a:p>
+          <a:p>
+            <a:pPr marL="0" indent="0">
+              <a:lnSpc>
+                <a:spcPct val="110000"/>
+              </a:lnSpc>
+              <a:buNone/>
+            </a:pPr>
+            <a:r>
+              <a:rPr lang="pt-BR" sz="2400" dirty="0">
+                <a:solidFill>
+                  <a:schemeClr val="accent1"/>
+                </a:solidFill>
+                <a:latin typeface="Arial" panose="020B0604020202020204" pitchFamily="34" charset="0"/>
+                <a:cs typeface="Arial" panose="020B0604020202020204" pitchFamily="34" charset="0"/>
+              </a:rPr>
+              <a:t>	- Testar só com o meu </a:t>
+            </a:r>
+            <a:r>
+              <a:rPr lang="pt-BR" sz="2400" dirty="0" err="1">
+                <a:solidFill>
+                  <a:schemeClr val="accent1"/>
+                </a:solidFill>
+                <a:latin typeface="Arial" panose="020B0604020202020204" pitchFamily="34" charset="0"/>
+                <a:cs typeface="Arial" panose="020B0604020202020204" pitchFamily="34" charset="0"/>
+              </a:rPr>
+              <a:t>dataset</a:t>
+            </a:r>
+            <a:endParaRPr lang="pt-BR" sz="2400" dirty="0">
+              <a:solidFill>
+                <a:schemeClr val="accent1"/>
+              </a:solidFill>
+              <a:latin typeface="Arial" panose="020B0604020202020204" pitchFamily="34" charset="0"/>
+              <a:cs typeface="Arial" panose="020B0604020202020204" pitchFamily="34" charset="0"/>
+            </a:endParaRPr>
+          </a:p>
+          <a:p>
+            <a:pPr marL="0" indent="0">
+              <a:lnSpc>
+                <a:spcPct val="110000"/>
+              </a:lnSpc>
+              <a:buNone/>
+            </a:pPr>
+            <a:r>
+              <a:rPr lang="pt-BR" sz="2400" dirty="0">
+                <a:solidFill>
+                  <a:schemeClr val="accent1"/>
+                </a:solidFill>
+                <a:latin typeface="Arial" panose="020B0604020202020204" pitchFamily="34" charset="0"/>
+                <a:cs typeface="Arial" panose="020B0604020202020204" pitchFamily="34" charset="0"/>
+              </a:rPr>
+              <a:t>	- </a:t>
+            </a:r>
+            <a:r>
+              <a:rPr lang="pt-BR" sz="2400" dirty="0" err="1">
+                <a:solidFill>
+                  <a:schemeClr val="accent1"/>
+                </a:solidFill>
+                <a:latin typeface="Arial" panose="020B0604020202020204" pitchFamily="34" charset="0"/>
+                <a:cs typeface="Arial" panose="020B0604020202020204" pitchFamily="34" charset="0"/>
+              </a:rPr>
+              <a:t>Reranking</a:t>
+            </a:r>
+            <a:r>
+              <a:rPr lang="pt-BR" sz="2400" dirty="0">
+                <a:solidFill>
+                  <a:schemeClr val="accent1"/>
+                </a:solidFill>
+                <a:latin typeface="Arial" panose="020B0604020202020204" pitchFamily="34" charset="0"/>
+                <a:cs typeface="Arial" panose="020B0604020202020204" pitchFamily="34" charset="0"/>
+              </a:rPr>
+              <a:t> com 100 hits em vez de 1000 hits</a:t>
+            </a:r>
+          </a:p>
+          <a:p>
+            <a:pPr marL="0" indent="0">
+              <a:lnSpc>
+                <a:spcPct val="110000"/>
+              </a:lnSpc>
               <a:buNone/>
             </a:pPr>
             <a:endParaRPr lang="pt-BR" sz="2400" dirty="0">
@@ -13661,6 +13911,117 @@
           </a:p>
           <a:p>
             <a:pPr marL="0" indent="0">
+              <a:lnSpc>
+                <a:spcPct val="110000"/>
+              </a:lnSpc>
+              <a:buNone/>
+            </a:pPr>
+            <a:r>
+              <a:rPr lang="pt-BR" sz="2400" dirty="0">
+                <a:solidFill>
+                  <a:schemeClr val="accent1"/>
+                </a:solidFill>
+                <a:latin typeface="Arial" panose="020B0604020202020204" pitchFamily="34" charset="0"/>
+                <a:cs typeface="Arial" panose="020B0604020202020204" pitchFamily="34" charset="0"/>
+              </a:rPr>
+              <a:t>A maior diferença foi em fazer o </a:t>
+            </a:r>
+            <a:r>
+              <a:rPr lang="pt-BR" sz="2400" dirty="0" err="1">
+                <a:solidFill>
+                  <a:schemeClr val="accent1"/>
+                </a:solidFill>
+                <a:latin typeface="Arial" panose="020B0604020202020204" pitchFamily="34" charset="0"/>
+                <a:cs typeface="Arial" panose="020B0604020202020204" pitchFamily="34" charset="0"/>
+              </a:rPr>
+              <a:t>reranking</a:t>
+            </a:r>
+            <a:r>
+              <a:rPr lang="pt-BR" sz="2400" dirty="0">
+                <a:solidFill>
+                  <a:schemeClr val="accent1"/>
+                </a:solidFill>
+                <a:latin typeface="Arial" panose="020B0604020202020204" pitchFamily="34" charset="0"/>
+                <a:cs typeface="Arial" panose="020B0604020202020204" pitchFamily="34" charset="0"/>
+              </a:rPr>
+              <a:t> só em 100 hits (chegou a 5 pontos no </a:t>
+            </a:r>
+            <a:r>
+              <a:rPr lang="pt-BR" sz="2400" dirty="0" err="1">
+                <a:solidFill>
+                  <a:schemeClr val="accent1"/>
+                </a:solidFill>
+                <a:latin typeface="Arial" panose="020B0604020202020204" pitchFamily="34" charset="0"/>
+                <a:cs typeface="Arial" panose="020B0604020202020204" pitchFamily="34" charset="0"/>
+              </a:rPr>
+              <a:t>nDCG</a:t>
+            </a:r>
+            <a:r>
+              <a:rPr lang="pt-BR" sz="2400" dirty="0">
+                <a:solidFill>
+                  <a:schemeClr val="accent1"/>
+                </a:solidFill>
+                <a:latin typeface="Arial" panose="020B0604020202020204" pitchFamily="34" charset="0"/>
+                <a:cs typeface="Arial" panose="020B0604020202020204" pitchFamily="34" charset="0"/>
+              </a:rPr>
+              <a:t> </a:t>
+            </a:r>
+            <a:r>
+              <a:rPr lang="pt-BR" sz="2400" b="1" i="1" dirty="0">
+                <a:solidFill>
+                  <a:schemeClr val="accent1"/>
+                </a:solidFill>
+                <a:latin typeface="Arial" panose="020B0604020202020204" pitchFamily="34" charset="0"/>
+                <a:cs typeface="Arial" panose="020B0604020202020204" pitchFamily="34" charset="0"/>
+              </a:rPr>
+              <a:t>dependendo</a:t>
+            </a:r>
+            <a:r>
+              <a:rPr lang="pt-BR" sz="2400" dirty="0">
+                <a:solidFill>
+                  <a:schemeClr val="accent1"/>
+                </a:solidFill>
+                <a:latin typeface="Arial" panose="020B0604020202020204" pitchFamily="34" charset="0"/>
+                <a:cs typeface="Arial" panose="020B0604020202020204" pitchFamily="34" charset="0"/>
+              </a:rPr>
+              <a:t> do modelo)</a:t>
+            </a:r>
+          </a:p>
+          <a:p>
+            <a:pPr marL="0" indent="0">
+              <a:lnSpc>
+                <a:spcPct val="110000"/>
+              </a:lnSpc>
+              <a:buNone/>
+            </a:pPr>
+            <a:endParaRPr lang="pt-BR" sz="2400" dirty="0">
+              <a:solidFill>
+                <a:schemeClr val="accent1"/>
+              </a:solidFill>
+              <a:latin typeface="Arial" panose="020B0604020202020204" pitchFamily="34" charset="0"/>
+              <a:cs typeface="Arial" panose="020B0604020202020204" pitchFamily="34" charset="0"/>
+            </a:endParaRPr>
+          </a:p>
+          <a:p>
+            <a:pPr marL="0" indent="0">
+              <a:lnSpc>
+                <a:spcPct val="110000"/>
+              </a:lnSpc>
+              <a:buNone/>
+            </a:pPr>
+            <a:endParaRPr lang="pt-BR" sz="2400" dirty="0">
+              <a:solidFill>
+                <a:schemeClr val="accent1"/>
+              </a:solidFill>
+              <a:latin typeface="Arial" panose="020B0604020202020204" pitchFamily="34" charset="0"/>
+              <a:cs typeface="Arial" panose="020B0604020202020204" pitchFamily="34" charset="0"/>
+            </a:endParaRPr>
+          </a:p>
+          <a:p>
+            <a:pPr marL="0" indent="0">
+              <a:lnSpc>
+                <a:spcPct val="110000"/>
+              </a:lnSpc>
               <a:buNone/>
             </a:pPr>
             <a:endParaRPr lang="pt-BR" sz="2400" dirty="0">
@@ -13797,8 +14158,8 @@
         </p:blipFill>
         <p:spPr>
           <a:xfrm>
-            <a:off x="4589712" y="2692034"/>
-            <a:ext cx="2867164" cy="3556385"/>
+            <a:off x="4296413" y="1971270"/>
+            <a:ext cx="2044184" cy="2535573"/>
           </a:xfrm>
           <a:prstGeom prst="rect">
             <a:avLst/>
@@ -13821,7 +14182,7 @@
         </p:nvSpPr>
         <p:spPr>
           <a:xfrm>
-            <a:off x="176168" y="1643152"/>
+            <a:off x="935293" y="1309760"/>
             <a:ext cx="11694252" cy="661510"/>
           </a:xfrm>
           <a:prstGeom prst="rect">
@@ -14010,6 +14371,380 @@
               </a:rPr>
               <a:t>Custo de US$ 0.77 para gerar 1.000 queries usando gpt-3.5-turbo</a:t>
             </a:r>
+          </a:p>
+        </p:txBody>
+      </p:sp>
+      <p:sp>
+        <p:nvSpPr>
+          <p:cNvPr id="3" name="Espaço Reservado para Conteúdo 3">
+            <a:extLst>
+              <a:ext uri="{FF2B5EF4-FFF2-40B4-BE49-F238E27FC236}">
+                <a16:creationId xmlns:a16="http://schemas.microsoft.com/office/drawing/2014/main" id="{536AADB6-290D-AF53-2381-2A84B1C44DFB}"/>
+              </a:ext>
+            </a:extLst>
+          </p:cNvPr>
+          <p:cNvSpPr txBox="1">
+            <a:spLocks/>
+          </p:cNvSpPr>
+          <p:nvPr/>
+        </p:nvSpPr>
+        <p:spPr>
+          <a:xfrm>
+            <a:off x="734683" y="4886729"/>
+            <a:ext cx="11694252" cy="1738357"/>
+          </a:xfrm>
+          <a:prstGeom prst="rect">
+            <a:avLst/>
+          </a:prstGeom>
+        </p:spPr>
+        <p:txBody>
+          <a:bodyPr rtlCol="0">
+            <a:normAutofit lnSpcReduction="10000"/>
+          </a:bodyPr>
+          <a:lstStyle>
+            <a:lvl1pPr marL="228600" indent="-228600" algn="l" defTabSz="914400" rtl="0" eaLnBrk="1" latinLnBrk="0" hangingPunct="1">
+              <a:lnSpc>
+                <a:spcPct val="90000"/>
+              </a:lnSpc>
+              <a:spcBef>
+                <a:spcPts val="1000"/>
+              </a:spcBef>
+              <a:buFont typeface="Arial" panose="020B0604020202020204" pitchFamily="34" charset="0"/>
+              <a:buChar char="•"/>
+              <a:defRPr sz="2800" kern="1200">
+                <a:solidFill>
+                  <a:schemeClr val="tx1"/>
+                </a:solidFill>
+                <a:latin typeface="+mn-lt"/>
+                <a:ea typeface="+mn-ea"/>
+                <a:cs typeface="+mn-cs"/>
+              </a:defRPr>
+            </a:lvl1pPr>
+            <a:lvl2pPr marL="685800" indent="-228600" algn="l" defTabSz="914400" rtl="0" eaLnBrk="1" latinLnBrk="0" hangingPunct="1">
+              <a:lnSpc>
+                <a:spcPct val="90000"/>
+              </a:lnSpc>
+              <a:spcBef>
+                <a:spcPts val="500"/>
+              </a:spcBef>
+              <a:buFont typeface="Arial" panose="020B0604020202020204" pitchFamily="34" charset="0"/>
+              <a:buChar char="•"/>
+              <a:defRPr sz="2400" kern="1200">
+                <a:solidFill>
+                  <a:schemeClr val="tx1"/>
+                </a:solidFill>
+                <a:latin typeface="+mn-lt"/>
+                <a:ea typeface="+mn-ea"/>
+                <a:cs typeface="+mn-cs"/>
+              </a:defRPr>
+            </a:lvl2pPr>
+            <a:lvl3pPr marL="1143000" indent="-228600" algn="l" defTabSz="914400" rtl="0" eaLnBrk="1" latinLnBrk="0" hangingPunct="1">
+              <a:lnSpc>
+                <a:spcPct val="90000"/>
+              </a:lnSpc>
+              <a:spcBef>
+                <a:spcPts val="500"/>
+              </a:spcBef>
+              <a:buFont typeface="Arial" panose="020B0604020202020204" pitchFamily="34" charset="0"/>
+              <a:buChar char="•"/>
+              <a:defRPr sz="2000" kern="1200">
+                <a:solidFill>
+                  <a:schemeClr val="tx1"/>
+                </a:solidFill>
+                <a:latin typeface="+mn-lt"/>
+                <a:ea typeface="+mn-ea"/>
+                <a:cs typeface="+mn-cs"/>
+              </a:defRPr>
+            </a:lvl3pPr>
+            <a:lvl4pPr marL="1600200" indent="-228600" algn="l" defTabSz="914400" rtl="0" eaLnBrk="1" latinLnBrk="0" hangingPunct="1">
+              <a:lnSpc>
+                <a:spcPct val="90000"/>
+              </a:lnSpc>
+              <a:spcBef>
+                <a:spcPts val="500"/>
+              </a:spcBef>
+              <a:buFont typeface="Arial" panose="020B0604020202020204" pitchFamily="34" charset="0"/>
+              <a:buChar char="•"/>
+              <a:defRPr sz="1800" kern="1200">
+                <a:solidFill>
+                  <a:schemeClr val="tx1"/>
+                </a:solidFill>
+                <a:latin typeface="+mn-lt"/>
+                <a:ea typeface="+mn-ea"/>
+                <a:cs typeface="+mn-cs"/>
+              </a:defRPr>
+            </a:lvl4pPr>
+            <a:lvl5pPr marL="2057400" indent="-228600" algn="l" defTabSz="914400" rtl="0" eaLnBrk="1" latinLnBrk="0" hangingPunct="1">
+              <a:lnSpc>
+                <a:spcPct val="90000"/>
+              </a:lnSpc>
+              <a:spcBef>
+                <a:spcPts val="500"/>
+              </a:spcBef>
+              <a:buFont typeface="Arial" panose="020B0604020202020204" pitchFamily="34" charset="0"/>
+              <a:buChar char="•"/>
+              <a:defRPr sz="1800" kern="1200">
+                <a:solidFill>
+                  <a:schemeClr val="tx1"/>
+                </a:solidFill>
+                <a:latin typeface="+mn-lt"/>
+                <a:ea typeface="+mn-ea"/>
+                <a:cs typeface="+mn-cs"/>
+              </a:defRPr>
+            </a:lvl5pPr>
+            <a:lvl6pPr marL="2514600" indent="-228600" algn="l" defTabSz="914400" rtl="0" eaLnBrk="1" latinLnBrk="0" hangingPunct="1">
+              <a:lnSpc>
+                <a:spcPct val="90000"/>
+              </a:lnSpc>
+              <a:spcBef>
+                <a:spcPts val="500"/>
+              </a:spcBef>
+              <a:buFont typeface="Arial" panose="020B0604020202020204" pitchFamily="34" charset="0"/>
+              <a:buChar char="•"/>
+              <a:defRPr sz="1800" kern="1200">
+                <a:solidFill>
+                  <a:schemeClr val="tx1"/>
+                </a:solidFill>
+                <a:latin typeface="+mn-lt"/>
+                <a:ea typeface="+mn-ea"/>
+                <a:cs typeface="+mn-cs"/>
+              </a:defRPr>
+            </a:lvl6pPr>
+            <a:lvl7pPr marL="2971800" indent="-228600" algn="l" defTabSz="914400" rtl="0" eaLnBrk="1" latinLnBrk="0" hangingPunct="1">
+              <a:lnSpc>
+                <a:spcPct val="90000"/>
+              </a:lnSpc>
+              <a:spcBef>
+                <a:spcPts val="500"/>
+              </a:spcBef>
+              <a:buFont typeface="Arial" panose="020B0604020202020204" pitchFamily="34" charset="0"/>
+              <a:buChar char="•"/>
+              <a:defRPr sz="1800" kern="1200">
+                <a:solidFill>
+                  <a:schemeClr val="tx1"/>
+                </a:solidFill>
+                <a:latin typeface="+mn-lt"/>
+                <a:ea typeface="+mn-ea"/>
+                <a:cs typeface="+mn-cs"/>
+              </a:defRPr>
+            </a:lvl7pPr>
+            <a:lvl8pPr marL="3429000" indent="-228600" algn="l" defTabSz="914400" rtl="0" eaLnBrk="1" latinLnBrk="0" hangingPunct="1">
+              <a:lnSpc>
+                <a:spcPct val="90000"/>
+              </a:lnSpc>
+              <a:spcBef>
+                <a:spcPts val="500"/>
+              </a:spcBef>
+              <a:buFont typeface="Arial" panose="020B0604020202020204" pitchFamily="34" charset="0"/>
+              <a:buChar char="•"/>
+              <a:defRPr sz="1800" kern="1200">
+                <a:solidFill>
+                  <a:schemeClr val="tx1"/>
+                </a:solidFill>
+                <a:latin typeface="+mn-lt"/>
+                <a:ea typeface="+mn-ea"/>
+                <a:cs typeface="+mn-cs"/>
+              </a:defRPr>
+            </a:lvl8pPr>
+            <a:lvl9pPr marL="3886200" indent="-228600" algn="l" defTabSz="914400" rtl="0" eaLnBrk="1" latinLnBrk="0" hangingPunct="1">
+              <a:lnSpc>
+                <a:spcPct val="90000"/>
+              </a:lnSpc>
+              <a:spcBef>
+                <a:spcPts val="500"/>
+              </a:spcBef>
+              <a:buFont typeface="Arial" panose="020B0604020202020204" pitchFamily="34" charset="0"/>
+              <a:buChar char="•"/>
+              <a:defRPr sz="1800" kern="1200">
+                <a:solidFill>
+                  <a:schemeClr val="tx1"/>
+                </a:solidFill>
+                <a:latin typeface="+mn-lt"/>
+                <a:ea typeface="+mn-ea"/>
+                <a:cs typeface="+mn-cs"/>
+              </a:defRPr>
+            </a:lvl9pPr>
+          </a:lstStyle>
+          <a:p>
+            <a:pPr marL="0" indent="0">
+              <a:buNone/>
+            </a:pPr>
+            <a:r>
+              <a:rPr lang="pt-BR" sz="2400" dirty="0">
+                <a:solidFill>
+                  <a:schemeClr val="accent1"/>
+                </a:solidFill>
+                <a:latin typeface="Arial" panose="020B0604020202020204" pitchFamily="34" charset="0"/>
+                <a:cs typeface="Arial" panose="020B0604020202020204" pitchFamily="34" charset="0"/>
+              </a:rPr>
+              <a:t>nDCG@10</a:t>
+            </a:r>
+          </a:p>
+          <a:p>
+            <a:pPr marL="0" indent="0">
+              <a:buNone/>
+            </a:pPr>
+            <a:r>
+              <a:rPr lang="pt-BR" sz="2400" dirty="0">
+                <a:solidFill>
+                  <a:schemeClr val="accent1"/>
+                </a:solidFill>
+                <a:latin typeface="Arial" panose="020B0604020202020204" pitchFamily="34" charset="0"/>
+                <a:cs typeface="Arial" panose="020B0604020202020204" pitchFamily="34" charset="0"/>
+              </a:rPr>
+              <a:t>0,7131 sem fine-</a:t>
+            </a:r>
+            <a:r>
+              <a:rPr lang="pt-BR" sz="2400" dirty="0" err="1">
+                <a:solidFill>
+                  <a:schemeClr val="accent1"/>
+                </a:solidFill>
+                <a:latin typeface="Arial" panose="020B0604020202020204" pitchFamily="34" charset="0"/>
+                <a:cs typeface="Arial" panose="020B0604020202020204" pitchFamily="34" charset="0"/>
+              </a:rPr>
+              <a:t>tuning</a:t>
+            </a:r>
+            <a:endParaRPr lang="pt-BR" sz="2400" dirty="0">
+              <a:solidFill>
+                <a:schemeClr val="accent1"/>
+              </a:solidFill>
+              <a:latin typeface="Arial" panose="020B0604020202020204" pitchFamily="34" charset="0"/>
+              <a:cs typeface="Arial" panose="020B0604020202020204" pitchFamily="34" charset="0"/>
+            </a:endParaRPr>
+          </a:p>
+          <a:p>
+            <a:pPr marL="0" indent="0">
+              <a:buNone/>
+            </a:pPr>
+            <a:r>
+              <a:rPr lang="pt-BR" sz="2400" dirty="0">
+                <a:solidFill>
+                  <a:schemeClr val="accent1"/>
+                </a:solidFill>
+                <a:latin typeface="Arial" panose="020B0604020202020204" pitchFamily="34" charset="0"/>
+                <a:cs typeface="Arial" panose="020B0604020202020204" pitchFamily="34" charset="0"/>
+              </a:rPr>
+              <a:t>0,6798 com fine-</a:t>
+            </a:r>
+            <a:r>
+              <a:rPr lang="pt-BR" sz="2400" dirty="0" err="1">
+                <a:solidFill>
+                  <a:schemeClr val="accent1"/>
+                </a:solidFill>
+                <a:latin typeface="Arial" panose="020B0604020202020204" pitchFamily="34" charset="0"/>
+                <a:cs typeface="Arial" panose="020B0604020202020204" pitchFamily="34" charset="0"/>
+              </a:rPr>
+              <a:t>tuning</a:t>
+            </a:r>
+            <a:r>
+              <a:rPr lang="pt-BR" sz="2400" dirty="0">
+                <a:solidFill>
+                  <a:schemeClr val="accent1"/>
+                </a:solidFill>
+                <a:latin typeface="Arial" panose="020B0604020202020204" pitchFamily="34" charset="0"/>
+                <a:cs typeface="Arial" panose="020B0604020202020204" pitchFamily="34" charset="0"/>
+              </a:rPr>
+              <a:t> e </a:t>
+            </a:r>
+            <a:r>
+              <a:rPr lang="pt-BR" sz="2400" dirty="0" err="1">
+                <a:solidFill>
+                  <a:schemeClr val="accent1"/>
+                </a:solidFill>
+                <a:latin typeface="Arial" panose="020B0604020202020204" pitchFamily="34" charset="0"/>
+                <a:cs typeface="Arial" panose="020B0604020202020204" pitchFamily="34" charset="0"/>
+              </a:rPr>
+              <a:t>reranking</a:t>
+            </a:r>
+            <a:r>
+              <a:rPr lang="pt-BR" sz="2400" dirty="0">
+                <a:solidFill>
+                  <a:schemeClr val="accent1"/>
+                </a:solidFill>
+                <a:latin typeface="Arial" panose="020B0604020202020204" pitchFamily="34" charset="0"/>
+                <a:cs typeface="Arial" panose="020B0604020202020204" pitchFamily="34" charset="0"/>
+              </a:rPr>
+              <a:t> em 1000 documentos</a:t>
+            </a:r>
+          </a:p>
+          <a:p>
+            <a:pPr marL="0" indent="0">
+              <a:buNone/>
+            </a:pPr>
+            <a:r>
+              <a:rPr lang="pt-BR" sz="2400" dirty="0">
+                <a:solidFill>
+                  <a:schemeClr val="accent1"/>
+                </a:solidFill>
+                <a:latin typeface="Arial" panose="020B0604020202020204" pitchFamily="34" charset="0"/>
+                <a:cs typeface="Arial" panose="020B0604020202020204" pitchFamily="34" charset="0"/>
+              </a:rPr>
+              <a:t>0,6827 com fine-</a:t>
+            </a:r>
+            <a:r>
+              <a:rPr lang="pt-BR" sz="2400" dirty="0" err="1">
+                <a:solidFill>
+                  <a:schemeClr val="accent1"/>
+                </a:solidFill>
+                <a:latin typeface="Arial" panose="020B0604020202020204" pitchFamily="34" charset="0"/>
+                <a:cs typeface="Arial" panose="020B0604020202020204" pitchFamily="34" charset="0"/>
+              </a:rPr>
+              <a:t>tuning</a:t>
+            </a:r>
+            <a:r>
+              <a:rPr lang="pt-BR" sz="2400" dirty="0">
+                <a:solidFill>
+                  <a:schemeClr val="accent1"/>
+                </a:solidFill>
+                <a:latin typeface="Arial" panose="020B0604020202020204" pitchFamily="34" charset="0"/>
+                <a:cs typeface="Arial" panose="020B0604020202020204" pitchFamily="34" charset="0"/>
+              </a:rPr>
+              <a:t> e </a:t>
+            </a:r>
+            <a:r>
+              <a:rPr lang="pt-BR" sz="2400" dirty="0" err="1">
+                <a:solidFill>
+                  <a:schemeClr val="accent1"/>
+                </a:solidFill>
+                <a:latin typeface="Arial" panose="020B0604020202020204" pitchFamily="34" charset="0"/>
+                <a:cs typeface="Arial" panose="020B0604020202020204" pitchFamily="34" charset="0"/>
+              </a:rPr>
+              <a:t>reranking</a:t>
+            </a:r>
+            <a:r>
+              <a:rPr lang="pt-BR" sz="2400" dirty="0">
+                <a:solidFill>
+                  <a:schemeClr val="accent1"/>
+                </a:solidFill>
+                <a:latin typeface="Arial" panose="020B0604020202020204" pitchFamily="34" charset="0"/>
+                <a:cs typeface="Arial" panose="020B0604020202020204" pitchFamily="34" charset="0"/>
+              </a:rPr>
+              <a:t> em 100 documentos</a:t>
+            </a:r>
+          </a:p>
+          <a:p>
+            <a:pPr marL="0" indent="0">
+              <a:buNone/>
+            </a:pPr>
+            <a:endParaRPr lang="pt-BR" sz="2400" dirty="0">
+              <a:solidFill>
+                <a:schemeClr val="accent1"/>
+              </a:solidFill>
+              <a:latin typeface="Arial" panose="020B0604020202020204" pitchFamily="34" charset="0"/>
+              <a:cs typeface="Arial" panose="020B0604020202020204" pitchFamily="34" charset="0"/>
+            </a:endParaRPr>
+          </a:p>
+          <a:p>
+            <a:pPr marL="0" indent="0">
+              <a:buNone/>
+            </a:pPr>
+            <a:endParaRPr lang="pt-BR" sz="2400" dirty="0">
+              <a:solidFill>
+                <a:schemeClr val="accent1"/>
+              </a:solidFill>
+              <a:latin typeface="Arial" panose="020B0604020202020204" pitchFamily="34" charset="0"/>
+              <a:cs typeface="Arial" panose="020B0604020202020204" pitchFamily="34" charset="0"/>
+            </a:endParaRPr>
           </a:p>
         </p:txBody>
       </p:sp>
@@ -14339,8 +15074,8 @@
         </p:nvSpPr>
         <p:spPr>
           <a:xfrm>
-            <a:off x="176168" y="1405785"/>
-            <a:ext cx="11694252" cy="1315709"/>
+            <a:off x="176168" y="1170155"/>
+            <a:ext cx="11694252" cy="1830236"/>
           </a:xfrm>
           <a:prstGeom prst="rect">
             <a:avLst/>
@@ -14348,7 +15083,7 @@
         </p:spPr>
         <p:txBody>
           <a:bodyPr rtlCol="0">
-            <a:normAutofit fontScale="92500"/>
+            <a:normAutofit/>
           </a:bodyPr>
           <a:lstStyle>
             <a:lvl1pPr marL="228600" indent="-228600" algn="l" defTabSz="914400" rtl="0" eaLnBrk="1" latinLnBrk="0" hangingPunct="1">
@@ -14931,7 +15666,7 @@
           <p:cNvPr id="2" name="Título 1">
             <a:extLst>
               <a:ext uri="{FF2B5EF4-FFF2-40B4-BE49-F238E27FC236}">
-                <a16:creationId xmlns:a16="http://schemas.microsoft.com/office/drawing/2014/main" id="{BCCAEE93-8585-46D4-A7EC-F184E317CB2E}"/>
+                <a16:creationId xmlns:a16="http://schemas.microsoft.com/office/drawing/2014/main" id="{6719F29B-F233-48AF-8261-F33A4E079E3E}"/>
               </a:ext>
             </a:extLst>
           </p:cNvPr>
@@ -14939,47 +15674,13 @@
             <a:spLocks noGrp="1"/>
           </p:cNvSpPr>
           <p:nvPr>
-            <p:ph type="ctrTitle"/>
+            <p:ph type="title"/>
           </p:nvPr>
         </p:nvSpPr>
         <p:spPr>
           <a:xfrm>
-            <a:off x="838200" y="2313571"/>
-            <a:ext cx="4419600" cy="1659716"/>
-          </a:xfrm>
-        </p:spPr>
-        <p:txBody>
-          <a:bodyPr rtlCol="0"/>
-          <a:lstStyle/>
-          <a:p>
-            <a:pPr rtl="0"/>
-            <a:r>
-              <a:rPr lang="pt-BR"/>
-              <a:t>Obrigado</a:t>
-            </a:r>
-          </a:p>
-        </p:txBody>
-      </p:sp>
-      <p:sp>
-        <p:nvSpPr>
-          <p:cNvPr id="3" name="Espaço Reservado para Conteúdo 2">
-            <a:extLst>
-              <a:ext uri="{FF2B5EF4-FFF2-40B4-BE49-F238E27FC236}">
-                <a16:creationId xmlns:a16="http://schemas.microsoft.com/office/drawing/2014/main" id="{24AFFC60-19C3-4901-93F7-7AAF4C09F8C6}"/>
-              </a:ext>
-            </a:extLst>
-          </p:cNvPr>
-          <p:cNvSpPr>
-            <a:spLocks noGrp="1"/>
-          </p:cNvSpPr>
-          <p:nvPr>
-            <p:ph type="subTitle" idx="1"/>
-          </p:nvPr>
-        </p:nvSpPr>
-        <p:spPr>
-          <a:xfrm>
-            <a:off x="7772402" y="2348318"/>
-            <a:ext cx="2743200" cy="1659715"/>
+            <a:off x="176168" y="402672"/>
+            <a:ext cx="11325137" cy="729788"/>
           </a:xfrm>
         </p:spPr>
         <p:txBody>
@@ -14988,6 +15689,601 @@
           </a:bodyPr>
           <a:lstStyle/>
           <a:p>
+            <a:pPr algn="l" rtl="0"/>
+            <a:r>
+              <a:rPr lang="pt-BR" dirty="0"/>
+              <a:t>Dúvida básica (?)</a:t>
+            </a:r>
+          </a:p>
+        </p:txBody>
+      </p:sp>
+      <p:sp>
+        <p:nvSpPr>
+          <p:cNvPr id="4" name="Espaço Reservado para o Número do Slide 3">
+            <a:extLst>
+              <a:ext uri="{FF2B5EF4-FFF2-40B4-BE49-F238E27FC236}">
+                <a16:creationId xmlns:a16="http://schemas.microsoft.com/office/drawing/2014/main" id="{328F602C-7F98-4C02-99D4-ED65E00D66A4}"/>
+              </a:ext>
+            </a:extLst>
+          </p:cNvPr>
+          <p:cNvSpPr>
+            <a:spLocks noGrp="1"/>
+          </p:cNvSpPr>
+          <p:nvPr>
+            <p:ph type="sldNum" sz="quarter" idx="12"/>
+          </p:nvPr>
+        </p:nvSpPr>
+        <p:spPr>
+          <a:xfrm>
+            <a:off x="8610600" y="6356350"/>
+            <a:ext cx="2743200" cy="365125"/>
+          </a:xfrm>
+        </p:spPr>
+        <p:txBody>
+          <a:bodyPr rtlCol="0"/>
+          <a:lstStyle/>
+          <a:p>
+            <a:pPr rtl="0"/>
+            <a:fld id="{19B51A1E-902D-48AF-9020-955120F399B6}" type="slidenum">
+              <a:rPr lang="pt-BR" smtClean="0"/>
+              <a:pPr rtl="0"/>
+              <a:t>8</a:t>
+            </a:fld>
+            <a:endParaRPr lang="pt-BR"/>
+          </a:p>
+        </p:txBody>
+      </p:sp>
+      <p:sp>
+        <p:nvSpPr>
+          <p:cNvPr id="20" name="Espaço Reservado para Conteúdo 3">
+            <a:extLst>
+              <a:ext uri="{FF2B5EF4-FFF2-40B4-BE49-F238E27FC236}">
+                <a16:creationId xmlns:a16="http://schemas.microsoft.com/office/drawing/2014/main" id="{A26C9687-67C8-0FE8-0794-47272524905A}"/>
+              </a:ext>
+            </a:extLst>
+          </p:cNvPr>
+          <p:cNvSpPr txBox="1">
+            <a:spLocks/>
+          </p:cNvSpPr>
+          <p:nvPr/>
+        </p:nvSpPr>
+        <p:spPr>
+          <a:xfrm>
+            <a:off x="176168" y="1643152"/>
+            <a:ext cx="11694252" cy="4812176"/>
+          </a:xfrm>
+          <a:prstGeom prst="rect">
+            <a:avLst/>
+          </a:prstGeom>
+        </p:spPr>
+        <p:txBody>
+          <a:bodyPr rtlCol="0">
+            <a:normAutofit/>
+          </a:bodyPr>
+          <a:lstStyle>
+            <a:lvl1pPr marL="228600" indent="-228600" algn="l" defTabSz="914400" rtl="0" eaLnBrk="1" latinLnBrk="0" hangingPunct="1">
+              <a:lnSpc>
+                <a:spcPct val="90000"/>
+              </a:lnSpc>
+              <a:spcBef>
+                <a:spcPts val="1000"/>
+              </a:spcBef>
+              <a:buFont typeface="Arial" panose="020B0604020202020204" pitchFamily="34" charset="0"/>
+              <a:buChar char="•"/>
+              <a:defRPr sz="2800" kern="1200">
+                <a:solidFill>
+                  <a:schemeClr val="tx1"/>
+                </a:solidFill>
+                <a:latin typeface="+mn-lt"/>
+                <a:ea typeface="+mn-ea"/>
+                <a:cs typeface="+mn-cs"/>
+              </a:defRPr>
+            </a:lvl1pPr>
+            <a:lvl2pPr marL="685800" indent="-228600" algn="l" defTabSz="914400" rtl="0" eaLnBrk="1" latinLnBrk="0" hangingPunct="1">
+              <a:lnSpc>
+                <a:spcPct val="90000"/>
+              </a:lnSpc>
+              <a:spcBef>
+                <a:spcPts val="500"/>
+              </a:spcBef>
+              <a:buFont typeface="Arial" panose="020B0604020202020204" pitchFamily="34" charset="0"/>
+              <a:buChar char="•"/>
+              <a:defRPr sz="2400" kern="1200">
+                <a:solidFill>
+                  <a:schemeClr val="tx1"/>
+                </a:solidFill>
+                <a:latin typeface="+mn-lt"/>
+                <a:ea typeface="+mn-ea"/>
+                <a:cs typeface="+mn-cs"/>
+              </a:defRPr>
+            </a:lvl2pPr>
+            <a:lvl3pPr marL="1143000" indent="-228600" algn="l" defTabSz="914400" rtl="0" eaLnBrk="1" latinLnBrk="0" hangingPunct="1">
+              <a:lnSpc>
+                <a:spcPct val="90000"/>
+              </a:lnSpc>
+              <a:spcBef>
+                <a:spcPts val="500"/>
+              </a:spcBef>
+              <a:buFont typeface="Arial" panose="020B0604020202020204" pitchFamily="34" charset="0"/>
+              <a:buChar char="•"/>
+              <a:defRPr sz="2000" kern="1200">
+                <a:solidFill>
+                  <a:schemeClr val="tx1"/>
+                </a:solidFill>
+                <a:latin typeface="+mn-lt"/>
+                <a:ea typeface="+mn-ea"/>
+                <a:cs typeface="+mn-cs"/>
+              </a:defRPr>
+            </a:lvl3pPr>
+            <a:lvl4pPr marL="1600200" indent="-228600" algn="l" defTabSz="914400" rtl="0" eaLnBrk="1" latinLnBrk="0" hangingPunct="1">
+              <a:lnSpc>
+                <a:spcPct val="90000"/>
+              </a:lnSpc>
+              <a:spcBef>
+                <a:spcPts val="500"/>
+              </a:spcBef>
+              <a:buFont typeface="Arial" panose="020B0604020202020204" pitchFamily="34" charset="0"/>
+              <a:buChar char="•"/>
+              <a:defRPr sz="1800" kern="1200">
+                <a:solidFill>
+                  <a:schemeClr val="tx1"/>
+                </a:solidFill>
+                <a:latin typeface="+mn-lt"/>
+                <a:ea typeface="+mn-ea"/>
+                <a:cs typeface="+mn-cs"/>
+              </a:defRPr>
+            </a:lvl4pPr>
+            <a:lvl5pPr marL="2057400" indent="-228600" algn="l" defTabSz="914400" rtl="0" eaLnBrk="1" latinLnBrk="0" hangingPunct="1">
+              <a:lnSpc>
+                <a:spcPct val="90000"/>
+              </a:lnSpc>
+              <a:spcBef>
+                <a:spcPts val="500"/>
+              </a:spcBef>
+              <a:buFont typeface="Arial" panose="020B0604020202020204" pitchFamily="34" charset="0"/>
+              <a:buChar char="•"/>
+              <a:defRPr sz="1800" kern="1200">
+                <a:solidFill>
+                  <a:schemeClr val="tx1"/>
+                </a:solidFill>
+                <a:latin typeface="+mn-lt"/>
+                <a:ea typeface="+mn-ea"/>
+                <a:cs typeface="+mn-cs"/>
+              </a:defRPr>
+            </a:lvl5pPr>
+            <a:lvl6pPr marL="2514600" indent="-228600" algn="l" defTabSz="914400" rtl="0" eaLnBrk="1" latinLnBrk="0" hangingPunct="1">
+              <a:lnSpc>
+                <a:spcPct val="90000"/>
+              </a:lnSpc>
+              <a:spcBef>
+                <a:spcPts val="500"/>
+              </a:spcBef>
+              <a:buFont typeface="Arial" panose="020B0604020202020204" pitchFamily="34" charset="0"/>
+              <a:buChar char="•"/>
+              <a:defRPr sz="1800" kern="1200">
+                <a:solidFill>
+                  <a:schemeClr val="tx1"/>
+                </a:solidFill>
+                <a:latin typeface="+mn-lt"/>
+                <a:ea typeface="+mn-ea"/>
+                <a:cs typeface="+mn-cs"/>
+              </a:defRPr>
+            </a:lvl6pPr>
+            <a:lvl7pPr marL="2971800" indent="-228600" algn="l" defTabSz="914400" rtl="0" eaLnBrk="1" latinLnBrk="0" hangingPunct="1">
+              <a:lnSpc>
+                <a:spcPct val="90000"/>
+              </a:lnSpc>
+              <a:spcBef>
+                <a:spcPts val="500"/>
+              </a:spcBef>
+              <a:buFont typeface="Arial" panose="020B0604020202020204" pitchFamily="34" charset="0"/>
+              <a:buChar char="•"/>
+              <a:defRPr sz="1800" kern="1200">
+                <a:solidFill>
+                  <a:schemeClr val="tx1"/>
+                </a:solidFill>
+                <a:latin typeface="+mn-lt"/>
+                <a:ea typeface="+mn-ea"/>
+                <a:cs typeface="+mn-cs"/>
+              </a:defRPr>
+            </a:lvl7pPr>
+            <a:lvl8pPr marL="3429000" indent="-228600" algn="l" defTabSz="914400" rtl="0" eaLnBrk="1" latinLnBrk="0" hangingPunct="1">
+              <a:lnSpc>
+                <a:spcPct val="90000"/>
+              </a:lnSpc>
+              <a:spcBef>
+                <a:spcPts val="500"/>
+              </a:spcBef>
+              <a:buFont typeface="Arial" panose="020B0604020202020204" pitchFamily="34" charset="0"/>
+              <a:buChar char="•"/>
+              <a:defRPr sz="1800" kern="1200">
+                <a:solidFill>
+                  <a:schemeClr val="tx1"/>
+                </a:solidFill>
+                <a:latin typeface="+mn-lt"/>
+                <a:ea typeface="+mn-ea"/>
+                <a:cs typeface="+mn-cs"/>
+              </a:defRPr>
+            </a:lvl8pPr>
+            <a:lvl9pPr marL="3886200" indent="-228600" algn="l" defTabSz="914400" rtl="0" eaLnBrk="1" latinLnBrk="0" hangingPunct="1">
+              <a:lnSpc>
+                <a:spcPct val="90000"/>
+              </a:lnSpc>
+              <a:spcBef>
+                <a:spcPts val="500"/>
+              </a:spcBef>
+              <a:buFont typeface="Arial" panose="020B0604020202020204" pitchFamily="34" charset="0"/>
+              <a:buChar char="•"/>
+              <a:defRPr sz="1800" kern="1200">
+                <a:solidFill>
+                  <a:schemeClr val="tx1"/>
+                </a:solidFill>
+                <a:latin typeface="+mn-lt"/>
+                <a:ea typeface="+mn-ea"/>
+                <a:cs typeface="+mn-cs"/>
+              </a:defRPr>
+            </a:lvl9pPr>
+          </a:lstStyle>
+          <a:p>
+            <a:pPr marL="457200" indent="-457200">
+              <a:lnSpc>
+                <a:spcPct val="100000"/>
+              </a:lnSpc>
+              <a:buAutoNum type="arabicPeriod"/>
+            </a:pPr>
+            <a:endParaRPr lang="pt-BR" sz="2400" dirty="0">
+              <a:solidFill>
+                <a:schemeClr val="accent1"/>
+              </a:solidFill>
+              <a:latin typeface="Arial" panose="020B0604020202020204" pitchFamily="34" charset="0"/>
+              <a:cs typeface="Arial" panose="020B0604020202020204" pitchFamily="34" charset="0"/>
+            </a:endParaRPr>
+          </a:p>
+        </p:txBody>
+      </p:sp>
+      <p:sp>
+        <p:nvSpPr>
+          <p:cNvPr id="3" name="Espaço Reservado para Conteúdo 3">
+            <a:extLst>
+              <a:ext uri="{FF2B5EF4-FFF2-40B4-BE49-F238E27FC236}">
+                <a16:creationId xmlns:a16="http://schemas.microsoft.com/office/drawing/2014/main" id="{1624027F-02E9-A18C-E521-0C9B9246AC90}"/>
+              </a:ext>
+            </a:extLst>
+          </p:cNvPr>
+          <p:cNvSpPr txBox="1">
+            <a:spLocks/>
+          </p:cNvSpPr>
+          <p:nvPr/>
+        </p:nvSpPr>
+        <p:spPr>
+          <a:xfrm>
+            <a:off x="176168" y="1405785"/>
+            <a:ext cx="11694252" cy="1315709"/>
+          </a:xfrm>
+          <a:prstGeom prst="rect">
+            <a:avLst/>
+          </a:prstGeom>
+        </p:spPr>
+        <p:txBody>
+          <a:bodyPr rtlCol="0">
+            <a:normAutofit/>
+          </a:bodyPr>
+          <a:lstStyle>
+            <a:lvl1pPr marL="228600" indent="-228600" algn="l" defTabSz="914400" rtl="0" eaLnBrk="1" latinLnBrk="0" hangingPunct="1">
+              <a:lnSpc>
+                <a:spcPct val="90000"/>
+              </a:lnSpc>
+              <a:spcBef>
+                <a:spcPts val="1000"/>
+              </a:spcBef>
+              <a:buFont typeface="Arial" panose="020B0604020202020204" pitchFamily="34" charset="0"/>
+              <a:buChar char="•"/>
+              <a:defRPr sz="2800" kern="1200">
+                <a:solidFill>
+                  <a:schemeClr val="tx1"/>
+                </a:solidFill>
+                <a:latin typeface="+mn-lt"/>
+                <a:ea typeface="+mn-ea"/>
+                <a:cs typeface="+mn-cs"/>
+              </a:defRPr>
+            </a:lvl1pPr>
+            <a:lvl2pPr marL="685800" indent="-228600" algn="l" defTabSz="914400" rtl="0" eaLnBrk="1" latinLnBrk="0" hangingPunct="1">
+              <a:lnSpc>
+                <a:spcPct val="90000"/>
+              </a:lnSpc>
+              <a:spcBef>
+                <a:spcPts val="500"/>
+              </a:spcBef>
+              <a:buFont typeface="Arial" panose="020B0604020202020204" pitchFamily="34" charset="0"/>
+              <a:buChar char="•"/>
+              <a:defRPr sz="2400" kern="1200">
+                <a:solidFill>
+                  <a:schemeClr val="tx1"/>
+                </a:solidFill>
+                <a:latin typeface="+mn-lt"/>
+                <a:ea typeface="+mn-ea"/>
+                <a:cs typeface="+mn-cs"/>
+              </a:defRPr>
+            </a:lvl2pPr>
+            <a:lvl3pPr marL="1143000" indent="-228600" algn="l" defTabSz="914400" rtl="0" eaLnBrk="1" latinLnBrk="0" hangingPunct="1">
+              <a:lnSpc>
+                <a:spcPct val="90000"/>
+              </a:lnSpc>
+              <a:spcBef>
+                <a:spcPts val="500"/>
+              </a:spcBef>
+              <a:buFont typeface="Arial" panose="020B0604020202020204" pitchFamily="34" charset="0"/>
+              <a:buChar char="•"/>
+              <a:defRPr sz="2000" kern="1200">
+                <a:solidFill>
+                  <a:schemeClr val="tx1"/>
+                </a:solidFill>
+                <a:latin typeface="+mn-lt"/>
+                <a:ea typeface="+mn-ea"/>
+                <a:cs typeface="+mn-cs"/>
+              </a:defRPr>
+            </a:lvl3pPr>
+            <a:lvl4pPr marL="1600200" indent="-228600" algn="l" defTabSz="914400" rtl="0" eaLnBrk="1" latinLnBrk="0" hangingPunct="1">
+              <a:lnSpc>
+                <a:spcPct val="90000"/>
+              </a:lnSpc>
+              <a:spcBef>
+                <a:spcPts val="500"/>
+              </a:spcBef>
+              <a:buFont typeface="Arial" panose="020B0604020202020204" pitchFamily="34" charset="0"/>
+              <a:buChar char="•"/>
+              <a:defRPr sz="1800" kern="1200">
+                <a:solidFill>
+                  <a:schemeClr val="tx1"/>
+                </a:solidFill>
+                <a:latin typeface="+mn-lt"/>
+                <a:ea typeface="+mn-ea"/>
+                <a:cs typeface="+mn-cs"/>
+              </a:defRPr>
+            </a:lvl4pPr>
+            <a:lvl5pPr marL="2057400" indent="-228600" algn="l" defTabSz="914400" rtl="0" eaLnBrk="1" latinLnBrk="0" hangingPunct="1">
+              <a:lnSpc>
+                <a:spcPct val="90000"/>
+              </a:lnSpc>
+              <a:spcBef>
+                <a:spcPts val="500"/>
+              </a:spcBef>
+              <a:buFont typeface="Arial" panose="020B0604020202020204" pitchFamily="34" charset="0"/>
+              <a:buChar char="•"/>
+              <a:defRPr sz="1800" kern="1200">
+                <a:solidFill>
+                  <a:schemeClr val="tx1"/>
+                </a:solidFill>
+                <a:latin typeface="+mn-lt"/>
+                <a:ea typeface="+mn-ea"/>
+                <a:cs typeface="+mn-cs"/>
+              </a:defRPr>
+            </a:lvl5pPr>
+            <a:lvl6pPr marL="2514600" indent="-228600" algn="l" defTabSz="914400" rtl="0" eaLnBrk="1" latinLnBrk="0" hangingPunct="1">
+              <a:lnSpc>
+                <a:spcPct val="90000"/>
+              </a:lnSpc>
+              <a:spcBef>
+                <a:spcPts val="500"/>
+              </a:spcBef>
+              <a:buFont typeface="Arial" panose="020B0604020202020204" pitchFamily="34" charset="0"/>
+              <a:buChar char="•"/>
+              <a:defRPr sz="1800" kern="1200">
+                <a:solidFill>
+                  <a:schemeClr val="tx1"/>
+                </a:solidFill>
+                <a:latin typeface="+mn-lt"/>
+                <a:ea typeface="+mn-ea"/>
+                <a:cs typeface="+mn-cs"/>
+              </a:defRPr>
+            </a:lvl6pPr>
+            <a:lvl7pPr marL="2971800" indent="-228600" algn="l" defTabSz="914400" rtl="0" eaLnBrk="1" latinLnBrk="0" hangingPunct="1">
+              <a:lnSpc>
+                <a:spcPct val="90000"/>
+              </a:lnSpc>
+              <a:spcBef>
+                <a:spcPts val="500"/>
+              </a:spcBef>
+              <a:buFont typeface="Arial" panose="020B0604020202020204" pitchFamily="34" charset="0"/>
+              <a:buChar char="•"/>
+              <a:defRPr sz="1800" kern="1200">
+                <a:solidFill>
+                  <a:schemeClr val="tx1"/>
+                </a:solidFill>
+                <a:latin typeface="+mn-lt"/>
+                <a:ea typeface="+mn-ea"/>
+                <a:cs typeface="+mn-cs"/>
+              </a:defRPr>
+            </a:lvl7pPr>
+            <a:lvl8pPr marL="3429000" indent="-228600" algn="l" defTabSz="914400" rtl="0" eaLnBrk="1" latinLnBrk="0" hangingPunct="1">
+              <a:lnSpc>
+                <a:spcPct val="90000"/>
+              </a:lnSpc>
+              <a:spcBef>
+                <a:spcPts val="500"/>
+              </a:spcBef>
+              <a:buFont typeface="Arial" panose="020B0604020202020204" pitchFamily="34" charset="0"/>
+              <a:buChar char="•"/>
+              <a:defRPr sz="1800" kern="1200">
+                <a:solidFill>
+                  <a:schemeClr val="tx1"/>
+                </a:solidFill>
+                <a:latin typeface="+mn-lt"/>
+                <a:ea typeface="+mn-ea"/>
+                <a:cs typeface="+mn-cs"/>
+              </a:defRPr>
+            </a:lvl8pPr>
+            <a:lvl9pPr marL="3886200" indent="-228600" algn="l" defTabSz="914400" rtl="0" eaLnBrk="1" latinLnBrk="0" hangingPunct="1">
+              <a:lnSpc>
+                <a:spcPct val="90000"/>
+              </a:lnSpc>
+              <a:spcBef>
+                <a:spcPts val="500"/>
+              </a:spcBef>
+              <a:buFont typeface="Arial" panose="020B0604020202020204" pitchFamily="34" charset="0"/>
+              <a:buChar char="•"/>
+              <a:defRPr sz="1800" kern="1200">
+                <a:solidFill>
+                  <a:schemeClr val="tx1"/>
+                </a:solidFill>
+                <a:latin typeface="+mn-lt"/>
+                <a:ea typeface="+mn-ea"/>
+                <a:cs typeface="+mn-cs"/>
+              </a:defRPr>
+            </a:lvl9pPr>
+          </a:lstStyle>
+          <a:p>
+            <a:pPr marL="0" indent="0">
+              <a:lnSpc>
+                <a:spcPct val="150000"/>
+              </a:lnSpc>
+              <a:buNone/>
+            </a:pPr>
+            <a:r>
+              <a:rPr lang="pt-BR" sz="2400" dirty="0">
+                <a:solidFill>
+                  <a:schemeClr val="accent1"/>
+                </a:solidFill>
+                <a:latin typeface="Arial" panose="020B0604020202020204" pitchFamily="34" charset="0"/>
+                <a:cs typeface="Arial" panose="020B0604020202020204" pitchFamily="34" charset="0"/>
+              </a:rPr>
+              <a:t>Qual o truque pra fazer o fine-</a:t>
+            </a:r>
+            <a:r>
+              <a:rPr lang="pt-BR" sz="2400" dirty="0" err="1">
+                <a:solidFill>
+                  <a:schemeClr val="accent1"/>
+                </a:solidFill>
+                <a:latin typeface="Arial" panose="020B0604020202020204" pitchFamily="34" charset="0"/>
+                <a:cs typeface="Arial" panose="020B0604020202020204" pitchFamily="34" charset="0"/>
+              </a:rPr>
+              <a:t>tuning</a:t>
+            </a:r>
+            <a:r>
+              <a:rPr lang="pt-BR" sz="2400" dirty="0">
+                <a:solidFill>
+                  <a:schemeClr val="accent1"/>
+                </a:solidFill>
+                <a:latin typeface="Arial" panose="020B0604020202020204" pitchFamily="34" charset="0"/>
+                <a:cs typeface="Arial" panose="020B0604020202020204" pitchFamily="34" charset="0"/>
+              </a:rPr>
+              <a:t> funcionar usando </a:t>
+            </a:r>
+            <a:r>
+              <a:rPr lang="pt-BR" sz="2400" dirty="0" err="1">
+                <a:solidFill>
+                  <a:schemeClr val="accent1"/>
+                </a:solidFill>
+                <a:latin typeface="Arial" panose="020B0604020202020204" pitchFamily="34" charset="0"/>
+                <a:cs typeface="Arial" panose="020B0604020202020204" pitchFamily="34" charset="0"/>
+              </a:rPr>
+              <a:t>AutoModelForSequenceClassification</a:t>
+            </a:r>
+            <a:r>
+              <a:rPr lang="pt-BR" sz="2400" dirty="0">
+                <a:solidFill>
+                  <a:schemeClr val="accent1"/>
+                </a:solidFill>
+                <a:latin typeface="Arial" panose="020B0604020202020204" pitchFamily="34" charset="0"/>
+                <a:cs typeface="Arial" panose="020B0604020202020204" pitchFamily="34" charset="0"/>
+              </a:rPr>
+              <a:t>?</a:t>
+            </a:r>
+          </a:p>
+        </p:txBody>
+      </p:sp>
+    </p:spTree>
+    <p:extLst>
+      <p:ext uri="{BB962C8B-B14F-4D97-AF65-F5344CB8AC3E}">
+        <p14:creationId xmlns:p14="http://schemas.microsoft.com/office/powerpoint/2010/main" val="2694644857"/>
+      </p:ext>
+    </p:extLst>
+  </p:cSld>
+  <p:clrMapOvr>
+    <a:masterClrMapping/>
+  </p:clrMapOvr>
+</p:sld>
+</file>
+
+<file path=ppt/slides/slide9.xml><?xml version="1.0" encoding="utf-8"?>
+<p:sld xmlns:a="http://schemas.openxmlformats.org/drawingml/2006/main" xmlns:r="http://schemas.openxmlformats.org/officeDocument/2006/relationships" xmlns:p="http://schemas.openxmlformats.org/presentationml/2006/main">
+  <p:cSld>
+    <p:spTree>
+      <p:nvGrpSpPr>
+        <p:cNvPr id="1" name=""/>
+        <p:cNvGrpSpPr/>
+        <p:nvPr/>
+      </p:nvGrpSpPr>
+      <p:grpSpPr>
+        <a:xfrm>
+          <a:off x="0" y="0"/>
+          <a:ext cx="0" cy="0"/>
+          <a:chOff x="0" y="0"/>
+          <a:chExt cx="0" cy="0"/>
+        </a:xfrm>
+      </p:grpSpPr>
+      <p:sp>
+        <p:nvSpPr>
+          <p:cNvPr id="2" name="Título 1">
+            <a:extLst>
+              <a:ext uri="{FF2B5EF4-FFF2-40B4-BE49-F238E27FC236}">
+                <a16:creationId xmlns:a16="http://schemas.microsoft.com/office/drawing/2014/main" id="{BCCAEE93-8585-46D4-A7EC-F184E317CB2E}"/>
+              </a:ext>
+            </a:extLst>
+          </p:cNvPr>
+          <p:cNvSpPr>
+            <a:spLocks noGrp="1"/>
+          </p:cNvSpPr>
+          <p:nvPr>
+            <p:ph type="ctrTitle"/>
+          </p:nvPr>
+        </p:nvSpPr>
+        <p:spPr>
+          <a:xfrm>
+            <a:off x="838200" y="2313571"/>
+            <a:ext cx="4419600" cy="1659716"/>
+          </a:xfrm>
+        </p:spPr>
+        <p:txBody>
+          <a:bodyPr rtlCol="0"/>
+          <a:lstStyle/>
+          <a:p>
+            <a:pPr rtl="0"/>
+            <a:r>
+              <a:rPr lang="pt-BR"/>
+              <a:t>Obrigado</a:t>
+            </a:r>
+          </a:p>
+        </p:txBody>
+      </p:sp>
+      <p:sp>
+        <p:nvSpPr>
+          <p:cNvPr id="3" name="Espaço Reservado para Conteúdo 2">
+            <a:extLst>
+              <a:ext uri="{FF2B5EF4-FFF2-40B4-BE49-F238E27FC236}">
+                <a16:creationId xmlns:a16="http://schemas.microsoft.com/office/drawing/2014/main" id="{24AFFC60-19C3-4901-93F7-7AAF4C09F8C6}"/>
+              </a:ext>
+            </a:extLst>
+          </p:cNvPr>
+          <p:cNvSpPr>
+            <a:spLocks noGrp="1"/>
+          </p:cNvSpPr>
+          <p:nvPr>
+            <p:ph type="subTitle" idx="1"/>
+          </p:nvPr>
+        </p:nvSpPr>
+        <p:spPr>
+          <a:xfrm>
+            <a:off x="7772402" y="2348318"/>
+            <a:ext cx="2743200" cy="1659715"/>
+          </a:xfrm>
+        </p:spPr>
+        <p:txBody>
+          <a:bodyPr rtlCol="0">
+            <a:normAutofit/>
+          </a:bodyPr>
+          <a:lstStyle/>
+          <a:p>
             <a:pPr rtl="0"/>
             <a:r>
               <a:rPr lang="pt-BR" dirty="0"/>
@@ -15033,7 +16329,7 @@
             <a:fld id="{B5CEABB6-07DC-46E8-9B57-56EC44A396E5}" type="slidenum">
               <a:rPr lang="pt-BR" smtClean="0"/>
               <a:pPr rtl="0"/>
-              <a:t>8</a:t>
+              <a:t>9</a:t>
             </a:fld>
             <a:endParaRPr lang="pt-BR"/>
           </a:p>
@@ -15844,6 +17140,25 @@
 </file>
 
 <file path=customXml/item1.xml><?xml version="1.0" encoding="utf-8"?>
+<p:properties xmlns:p="http://schemas.microsoft.com/office/2006/metadata/properties" xmlns:xsi="http://www.w3.org/2001/XMLSchema-instance" xmlns:pc="http://schemas.microsoft.com/office/infopath/2007/PartnerControls">
+  <documentManagement>
+    <_ip_UnifiedCompliancePolicyUIAction xmlns="http://schemas.microsoft.com/sharepoint/v3" xsi:nil="true"/>
+    <Image xmlns="71af3243-3dd4-4a8d-8c0d-dd76da1f02a5">
+      <Url xsi:nil="true"/>
+      <Description xsi:nil="true"/>
+    </Image>
+    <Status xmlns="71af3243-3dd4-4a8d-8c0d-dd76da1f02a5">Not started</Status>
+    <_ip_UnifiedCompliancePolicyProperties xmlns="http://schemas.microsoft.com/sharepoint/v3" xsi:nil="true"/>
+    <ImageTagsTaxHTField xmlns="71af3243-3dd4-4a8d-8c0d-dd76da1f02a5">
+      <Terms xmlns="http://schemas.microsoft.com/office/infopath/2007/PartnerControls"/>
+    </ImageTagsTaxHTField>
+    <TaxCatchAll xmlns="230e9df3-be65-4c73-a93b-d1236ebd677e"/>
+    <MediaServiceKeyPoints xmlns="71af3243-3dd4-4a8d-8c0d-dd76da1f02a5" xsi:nil="true"/>
+  </documentManagement>
+</p:properties>
+</file>
+
+<file path=customXml/item2.xml><?xml version="1.0" encoding="utf-8"?>
 <ct:contentTypeSchema xmlns:ct="http://schemas.microsoft.com/office/2006/metadata/contentType" xmlns:ma="http://schemas.microsoft.com/office/2006/metadata/properties/metaAttributes" ct:_="" ma:_="" ma:contentTypeName="Document" ma:contentTypeID="0x01010079F111ED35F8CC479449609E8A0923A6" ma:contentTypeVersion="21" ma:contentTypeDescription="Create a new document." ma:contentTypeScope="" ma:versionID="64dfb1555687e0874b4304b796b5b0c7">
   <xsd:schema xmlns:xsd="http://www.w3.org/2001/XMLSchema" xmlns:xs="http://www.w3.org/2001/XMLSchema" xmlns:p="http://schemas.microsoft.com/office/2006/metadata/properties" xmlns:ns1="http://schemas.microsoft.com/sharepoint/v3" xmlns:ns2="71af3243-3dd4-4a8d-8c0d-dd76da1f02a5" xmlns:ns3="16c05727-aa75-4e4a-9b5f-8a80a1165891" xmlns:ns4="230e9df3-be65-4c73-a93b-d1236ebd677e" targetNamespace="http://schemas.microsoft.com/office/2006/metadata/properties" ma:root="true" ma:fieldsID="e6e4c555b5e194d05b7203de9c4567b3" ns1:_="" ns2:_="" ns3:_="" ns4:_="">
     <xsd:import namespace="http://schemas.microsoft.com/sharepoint/v3"/>
@@ -16125,25 +17440,6 @@
 </ct:contentTypeSchema>
 </file>
 
-<file path=customXml/item2.xml><?xml version="1.0" encoding="utf-8"?>
-<p:properties xmlns:p="http://schemas.microsoft.com/office/2006/metadata/properties" xmlns:xsi="http://www.w3.org/2001/XMLSchema-instance" xmlns:pc="http://schemas.microsoft.com/office/infopath/2007/PartnerControls">
-  <documentManagement>
-    <_ip_UnifiedCompliancePolicyUIAction xmlns="http://schemas.microsoft.com/sharepoint/v3" xsi:nil="true"/>
-    <Image xmlns="71af3243-3dd4-4a8d-8c0d-dd76da1f02a5">
-      <Url xsi:nil="true"/>
-      <Description xsi:nil="true"/>
-    </Image>
-    <Status xmlns="71af3243-3dd4-4a8d-8c0d-dd76da1f02a5">Not started</Status>
-    <_ip_UnifiedCompliancePolicyProperties xmlns="http://schemas.microsoft.com/sharepoint/v3" xsi:nil="true"/>
-    <ImageTagsTaxHTField xmlns="71af3243-3dd4-4a8d-8c0d-dd76da1f02a5">
-      <Terms xmlns="http://schemas.microsoft.com/office/infopath/2007/PartnerControls"/>
-    </ImageTagsTaxHTField>
-    <TaxCatchAll xmlns="230e9df3-be65-4c73-a93b-d1236ebd677e"/>
-    <MediaServiceKeyPoints xmlns="71af3243-3dd4-4a8d-8c0d-dd76da1f02a5" xsi:nil="true"/>
-  </documentManagement>
-</p:properties>
-</file>
-
 <file path=customXml/item3.xml><?xml version="1.0" encoding="utf-8"?>
 <?mso-contentType ?>
 <FormTemplates xmlns="http://schemas.microsoft.com/sharepoint/v3/contenttype/forms">
@@ -16154,6 +17450,25 @@
 </file>
 
 <file path=customXml/itemProps1.xml><?xml version="1.0" encoding="utf-8"?>
+<ds:datastoreItem xmlns:ds="http://schemas.openxmlformats.org/officeDocument/2006/customXml" ds:itemID="{CA4F7154-AFAC-4BE7-8A74-7F4B6FC2743C}">
+  <ds:schemaRefs>
+    <ds:schemaRef ds:uri="http://schemas.microsoft.com/office/2006/metadata/properties"/>
+    <ds:schemaRef ds:uri="16c05727-aa75-4e4a-9b5f-8a80a1165891"/>
+    <ds:schemaRef ds:uri="http://schemas.microsoft.com/office/2006/documentManagement/types"/>
+    <ds:schemaRef ds:uri="http://purl.org/dc/terms/"/>
+    <ds:schemaRef ds:uri="http://schemas.microsoft.com/office/infopath/2007/PartnerControls"/>
+    <ds:schemaRef ds:uri="71af3243-3dd4-4a8d-8c0d-dd76da1f02a5"/>
+    <ds:schemaRef ds:uri="http://schemas.microsoft.com/sharepoint/v3"/>
+    <ds:schemaRef ds:uri="http://purl.org/dc/elements/1.1/"/>
+    <ds:schemaRef ds:uri="http://www.w3.org/XML/1998/namespace"/>
+    <ds:schemaRef ds:uri="http://schemas.openxmlformats.org/package/2006/metadata/core-properties"/>
+    <ds:schemaRef ds:uri="230e9df3-be65-4c73-a93b-d1236ebd677e"/>
+    <ds:schemaRef ds:uri="http://purl.org/dc/dcmitype/"/>
+  </ds:schemaRefs>
+</ds:datastoreItem>
+</file>
+
+<file path=customXml/itemProps2.xml><?xml version="1.0" encoding="utf-8"?>
 <ds:datastoreItem xmlns:ds="http://schemas.openxmlformats.org/officeDocument/2006/customXml" ds:itemID="{67ACD96E-49A0-4DA4-A7BB-AC2D8874213F}">
   <ds:schemaRefs>
     <ds:schemaRef ds:uri="http://schemas.microsoft.com/office/2006/metadata/contentType"/>
@@ -16174,25 +17489,6 @@
 </ds:datastoreItem>
 </file>
 
-<file path=customXml/itemProps2.xml><?xml version="1.0" encoding="utf-8"?>
-<ds:datastoreItem xmlns:ds="http://schemas.openxmlformats.org/officeDocument/2006/customXml" ds:itemID="{CA4F7154-AFAC-4BE7-8A74-7F4B6FC2743C}">
-  <ds:schemaRefs>
-    <ds:schemaRef ds:uri="http://www.w3.org/XML/1998/namespace"/>
-    <ds:schemaRef ds:uri="http://schemas.microsoft.com/office/2006/documentManagement/types"/>
-    <ds:schemaRef ds:uri="http://schemas.microsoft.com/office/infopath/2007/PartnerControls"/>
-    <ds:schemaRef ds:uri="http://purl.org/dc/dcmitype/"/>
-    <ds:schemaRef ds:uri="71af3243-3dd4-4a8d-8c0d-dd76da1f02a5"/>
-    <ds:schemaRef ds:uri="http://schemas.openxmlformats.org/package/2006/metadata/core-properties"/>
-    <ds:schemaRef ds:uri="http://purl.org/dc/terms/"/>
-    <ds:schemaRef ds:uri="230e9df3-be65-4c73-a93b-d1236ebd677e"/>
-    <ds:schemaRef ds:uri="http://schemas.microsoft.com/office/2006/metadata/properties"/>
-    <ds:schemaRef ds:uri="16c05727-aa75-4e4a-9b5f-8a80a1165891"/>
-    <ds:schemaRef ds:uri="http://schemas.microsoft.com/sharepoint/v3"/>
-    <ds:schemaRef ds:uri="http://purl.org/dc/elements/1.1/"/>
-  </ds:schemaRefs>
-</ds:datastoreItem>
-</file>
-
 <file path=customXml/itemProps3.xml><?xml version="1.0" encoding="utf-8"?>
 <ds:datastoreItem xmlns:ds="http://schemas.openxmlformats.org/officeDocument/2006/customXml" ds:itemID="{E618C13B-9D83-4AF4-B64D-33362D5133F8}">
   <ds:schemaRefs>

</xml_diff>